<commit_message>
Updated project and completed Module 3 slides
</commit_message>
<xml_diff>
--- a/Slides/Mod 3 - Integrating Touch.pptx
+++ b/Slides/Mod 3 - Integrating Touch.pptx
@@ -15,6 +15,15 @@
     <p:sldId id="260" r:id="rId9"/>
     <p:sldId id="264" r:id="rId10"/>
     <p:sldId id="265" r:id="rId11"/>
+    <p:sldId id="266" r:id="rId12"/>
+    <p:sldId id="267" r:id="rId13"/>
+    <p:sldId id="268" r:id="rId14"/>
+    <p:sldId id="269" r:id="rId15"/>
+    <p:sldId id="270" r:id="rId16"/>
+    <p:sldId id="271" r:id="rId17"/>
+    <p:sldId id="272" r:id="rId18"/>
+    <p:sldId id="273" r:id="rId19"/>
+    <p:sldId id="274" r:id="rId20"/>
   </p:sldIdLst>
   <p:sldSz cx="12192000" cy="6858000"/>
   <p:notesSz cx="6858000" cy="9144000"/>
@@ -2840,6 +2849,2560 @@
     <p:extLst>
       <p:ext uri="{BB962C8B-B14F-4D97-AF65-F5344CB8AC3E}">
         <p14:creationId xmlns:p14="http://schemas.microsoft.com/office/powerpoint/2010/main" val="3211727235"/>
+      </p:ext>
+    </p:extLst>
+  </p:cSld>
+  <p:clrMapOvr>
+    <a:masterClrMapping/>
+  </p:clrMapOvr>
+  <p:timing>
+    <p:tnLst>
+      <p:par>
+        <p:cTn id="1" dur="indefinite" restart="never" nodeType="tmRoot"/>
+      </p:par>
+    </p:tnLst>
+  </p:timing>
+</p:sld>
+</file>
+
+<file path=ppt/slides/slide11.xml><?xml version="1.0" encoding="utf-8"?>
+<p:sld xmlns:a="http://schemas.openxmlformats.org/drawingml/2006/main" xmlns:r="http://schemas.openxmlformats.org/officeDocument/2006/relationships" xmlns:p="http://schemas.openxmlformats.org/presentationml/2006/main">
+  <p:cSld>
+    <p:spTree>
+      <p:nvGrpSpPr>
+        <p:cNvPr id="1" name=""/>
+        <p:cNvGrpSpPr/>
+        <p:nvPr/>
+      </p:nvGrpSpPr>
+      <p:grpSpPr>
+        <a:xfrm>
+          <a:off x="0" y="0"/>
+          <a:ext cx="0" cy="0"/>
+          <a:chOff x="0" y="0"/>
+          <a:chExt cx="0" cy="0"/>
+        </a:xfrm>
+      </p:grpSpPr>
+      <p:sp>
+        <p:nvSpPr>
+          <p:cNvPr id="4" name="Text Placeholder 3"/>
+          <p:cNvSpPr>
+            <a:spLocks noGrp="1"/>
+          </p:cNvSpPr>
+          <p:nvPr>
+            <p:ph type="body" sz="quarter" idx="10"/>
+          </p:nvPr>
+        </p:nvSpPr>
+        <p:spPr/>
+        <p:txBody>
+          <a:bodyPr/>
+          <a:lstStyle/>
+          <a:p>
+            <a:r>
+              <a:rPr lang="en-US" dirty="0" smtClean="0"/>
+              <a:t>Hammer.js</a:t>
+            </a:r>
+            <a:endParaRPr lang="en-US" dirty="0"/>
+          </a:p>
+        </p:txBody>
+      </p:sp>
+      <p:sp>
+        <p:nvSpPr>
+          <p:cNvPr id="3" name="Subtitle 2"/>
+          <p:cNvSpPr>
+            <a:spLocks noGrp="1"/>
+          </p:cNvSpPr>
+          <p:nvPr>
+            <p:ph type="subTitle" idx="1"/>
+          </p:nvPr>
+        </p:nvSpPr>
+        <p:spPr/>
+        <p:txBody>
+          <a:bodyPr/>
+          <a:lstStyle/>
+          <a:p>
+            <a:endParaRPr lang="en-US" dirty="0"/>
+          </a:p>
+        </p:txBody>
+      </p:sp>
+    </p:spTree>
+    <p:extLst>
+      <p:ext uri="{BB962C8B-B14F-4D97-AF65-F5344CB8AC3E}">
+        <p14:creationId xmlns:p14="http://schemas.microsoft.com/office/powerpoint/2010/main" val="3330895959"/>
+      </p:ext>
+    </p:extLst>
+  </p:cSld>
+  <p:clrMapOvr>
+    <a:masterClrMapping/>
+  </p:clrMapOvr>
+  <p:timing>
+    <p:tnLst>
+      <p:par>
+        <p:cTn id="1" dur="indefinite" restart="never" nodeType="tmRoot"/>
+      </p:par>
+    </p:tnLst>
+  </p:timing>
+</p:sld>
+</file>
+
+<file path=ppt/slides/slide12.xml><?xml version="1.0" encoding="utf-8"?>
+<p:sld xmlns:a="http://schemas.openxmlformats.org/drawingml/2006/main" xmlns:r="http://schemas.openxmlformats.org/officeDocument/2006/relationships" xmlns:p="http://schemas.openxmlformats.org/presentationml/2006/main">
+  <p:cSld>
+    <p:spTree>
+      <p:nvGrpSpPr>
+        <p:cNvPr id="1" name=""/>
+        <p:cNvGrpSpPr/>
+        <p:nvPr/>
+      </p:nvGrpSpPr>
+      <p:grpSpPr>
+        <a:xfrm>
+          <a:off x="0" y="0"/>
+          <a:ext cx="0" cy="0"/>
+          <a:chOff x="0" y="0"/>
+          <a:chExt cx="0" cy="0"/>
+        </a:xfrm>
+      </p:grpSpPr>
+      <p:sp>
+        <p:nvSpPr>
+          <p:cNvPr id="4" name="Title 3"/>
+          <p:cNvSpPr>
+            <a:spLocks noGrp="1"/>
+          </p:cNvSpPr>
+          <p:nvPr>
+            <p:ph type="title"/>
+          </p:nvPr>
+        </p:nvSpPr>
+        <p:spPr/>
+        <p:txBody>
+          <a:bodyPr/>
+          <a:lstStyle/>
+          <a:p>
+            <a:r>
+              <a:rPr lang="en-US" dirty="0" smtClean="0"/>
+              <a:t>Hammer.js</a:t>
+            </a:r>
+            <a:endParaRPr lang="en-US" dirty="0"/>
+          </a:p>
+        </p:txBody>
+      </p:sp>
+      <p:sp>
+        <p:nvSpPr>
+          <p:cNvPr id="5" name="Content Placeholder 4"/>
+          <p:cNvSpPr>
+            <a:spLocks noGrp="1"/>
+          </p:cNvSpPr>
+          <p:nvPr>
+            <p:ph sz="quarter" idx="10"/>
+          </p:nvPr>
+        </p:nvSpPr>
+        <p:spPr/>
+        <p:txBody>
+          <a:bodyPr/>
+          <a:lstStyle/>
+          <a:p>
+            <a:r>
+              <a:rPr lang="en-US" dirty="0" smtClean="0"/>
+              <a:t>Library basics</a:t>
+            </a:r>
+          </a:p>
+          <a:p>
+            <a:r>
+              <a:rPr lang="en-US" dirty="0" smtClean="0"/>
+              <a:t>Events</a:t>
+            </a:r>
+          </a:p>
+          <a:p>
+            <a:r>
+              <a:rPr lang="en-US" dirty="0" smtClean="0"/>
+              <a:t>Registering handlers</a:t>
+            </a:r>
+          </a:p>
+          <a:p>
+            <a:r>
+              <a:rPr lang="en-US" dirty="0" smtClean="0"/>
+              <a:t>Responding to events</a:t>
+            </a:r>
+            <a:endParaRPr lang="en-US" dirty="0"/>
+          </a:p>
+        </p:txBody>
+      </p:sp>
+    </p:spTree>
+    <p:extLst>
+      <p:ext uri="{BB962C8B-B14F-4D97-AF65-F5344CB8AC3E}">
+        <p14:creationId xmlns:p14="http://schemas.microsoft.com/office/powerpoint/2010/main" val="3039537409"/>
+      </p:ext>
+    </p:extLst>
+  </p:cSld>
+  <p:clrMapOvr>
+    <a:masterClrMapping/>
+  </p:clrMapOvr>
+  <p:timing>
+    <p:tnLst>
+      <p:par>
+        <p:cTn id="1" dur="indefinite" restart="never" nodeType="tmRoot"/>
+      </p:par>
+    </p:tnLst>
+  </p:timing>
+</p:sld>
+</file>
+
+<file path=ppt/slides/slide13.xml><?xml version="1.0" encoding="utf-8"?>
+<p:sld xmlns:a="http://schemas.openxmlformats.org/drawingml/2006/main" xmlns:r="http://schemas.openxmlformats.org/officeDocument/2006/relationships" xmlns:p="http://schemas.openxmlformats.org/presentationml/2006/main">
+  <p:cSld>
+    <p:spTree>
+      <p:nvGrpSpPr>
+        <p:cNvPr id="1" name=""/>
+        <p:cNvGrpSpPr/>
+        <p:nvPr/>
+      </p:nvGrpSpPr>
+      <p:grpSpPr>
+        <a:xfrm>
+          <a:off x="0" y="0"/>
+          <a:ext cx="0" cy="0"/>
+          <a:chOff x="0" y="0"/>
+          <a:chExt cx="0" cy="0"/>
+        </a:xfrm>
+      </p:grpSpPr>
+      <p:sp>
+        <p:nvSpPr>
+          <p:cNvPr id="2" name="Title 1"/>
+          <p:cNvSpPr>
+            <a:spLocks noGrp="1"/>
+          </p:cNvSpPr>
+          <p:nvPr>
+            <p:ph type="title"/>
+          </p:nvPr>
+        </p:nvSpPr>
+        <p:spPr/>
+        <p:txBody>
+          <a:bodyPr/>
+          <a:lstStyle/>
+          <a:p>
+            <a:r>
+              <a:rPr lang="en-US" dirty="0" smtClean="0"/>
+              <a:t>Library basics</a:t>
+            </a:r>
+            <a:endParaRPr lang="en-US" dirty="0"/>
+          </a:p>
+        </p:txBody>
+      </p:sp>
+      <p:sp>
+        <p:nvSpPr>
+          <p:cNvPr id="3" name="Content Placeholder 2"/>
+          <p:cNvSpPr>
+            <a:spLocks noGrp="1"/>
+          </p:cNvSpPr>
+          <p:nvPr>
+            <p:ph sz="quarter" idx="10"/>
+          </p:nvPr>
+        </p:nvSpPr>
+        <p:spPr/>
+        <p:txBody>
+          <a:bodyPr/>
+          <a:lstStyle/>
+          <a:p>
+            <a:r>
+              <a:rPr lang="en-US" dirty="0" smtClean="0"/>
+              <a:t>Simplifies creation of touch-enabled applications</a:t>
+            </a:r>
+          </a:p>
+          <a:p>
+            <a:r>
+              <a:rPr lang="en-US" dirty="0" smtClean="0"/>
+              <a:t>Does not require jQuery</a:t>
+            </a:r>
+          </a:p>
+          <a:p>
+            <a:r>
+              <a:rPr lang="en-US" dirty="0" smtClean="0"/>
+              <a:t>jQuery plugin is available to add events to jQuery objects</a:t>
+            </a:r>
+          </a:p>
+        </p:txBody>
+      </p:sp>
+    </p:spTree>
+    <p:extLst>
+      <p:ext uri="{BB962C8B-B14F-4D97-AF65-F5344CB8AC3E}">
+        <p14:creationId xmlns:p14="http://schemas.microsoft.com/office/powerpoint/2010/main" val="4111079291"/>
+      </p:ext>
+    </p:extLst>
+  </p:cSld>
+  <p:clrMapOvr>
+    <a:masterClrMapping/>
+  </p:clrMapOvr>
+  <p:timing>
+    <p:tnLst>
+      <p:par>
+        <p:cTn id="1" dur="indefinite" restart="never" nodeType="tmRoot"/>
+      </p:par>
+    </p:tnLst>
+  </p:timing>
+</p:sld>
+</file>
+
+<file path=ppt/slides/slide14.xml><?xml version="1.0" encoding="utf-8"?>
+<p:sld xmlns:a="http://schemas.openxmlformats.org/drawingml/2006/main" xmlns:r="http://schemas.openxmlformats.org/officeDocument/2006/relationships" xmlns:p="http://schemas.openxmlformats.org/presentationml/2006/main">
+  <p:cSld>
+    <p:spTree>
+      <p:nvGrpSpPr>
+        <p:cNvPr id="1" name=""/>
+        <p:cNvGrpSpPr/>
+        <p:nvPr/>
+      </p:nvGrpSpPr>
+      <p:grpSpPr>
+        <a:xfrm>
+          <a:off x="0" y="0"/>
+          <a:ext cx="0" cy="0"/>
+          <a:chOff x="0" y="0"/>
+          <a:chExt cx="0" cy="0"/>
+        </a:xfrm>
+      </p:grpSpPr>
+      <p:sp>
+        <p:nvSpPr>
+          <p:cNvPr id="2" name="Title 1"/>
+          <p:cNvSpPr>
+            <a:spLocks noGrp="1"/>
+          </p:cNvSpPr>
+          <p:nvPr>
+            <p:ph type="title"/>
+          </p:nvPr>
+        </p:nvSpPr>
+        <p:spPr/>
+        <p:txBody>
+          <a:bodyPr/>
+          <a:lstStyle/>
+          <a:p>
+            <a:r>
+              <a:rPr lang="en-US" dirty="0" smtClean="0"/>
+              <a:t>Events</a:t>
+            </a:r>
+            <a:endParaRPr lang="en-US" dirty="0"/>
+          </a:p>
+        </p:txBody>
+      </p:sp>
+      <p:sp>
+        <p:nvSpPr>
+          <p:cNvPr id="3" name="Content Placeholder 2"/>
+          <p:cNvSpPr>
+            <a:spLocks noGrp="1"/>
+          </p:cNvSpPr>
+          <p:nvPr>
+            <p:ph sz="quarter" idx="10"/>
+          </p:nvPr>
+        </p:nvSpPr>
+        <p:spPr>
+          <a:xfrm>
+            <a:off x="379413" y="1388226"/>
+            <a:ext cx="5861589" cy="5290388"/>
+          </a:xfrm>
+        </p:spPr>
+        <p:txBody>
+          <a:bodyPr/>
+          <a:lstStyle/>
+          <a:p>
+            <a:r>
+              <a:rPr lang="en-US" dirty="0"/>
+              <a:t>Tap</a:t>
+            </a:r>
+          </a:p>
+          <a:p>
+            <a:r>
+              <a:rPr lang="en-US" dirty="0" smtClean="0"/>
+              <a:t>Press</a:t>
+            </a:r>
+          </a:p>
+          <a:p>
+            <a:r>
+              <a:rPr lang="en-US" dirty="0" smtClean="0"/>
+              <a:t>Pan</a:t>
+            </a:r>
+          </a:p>
+          <a:p>
+            <a:r>
+              <a:rPr lang="en-US" dirty="0"/>
+              <a:t>Swipe </a:t>
+            </a:r>
+            <a:endParaRPr lang="en-US" dirty="0" smtClean="0"/>
+          </a:p>
+          <a:p>
+            <a:r>
+              <a:rPr lang="en-US" dirty="0" smtClean="0"/>
+              <a:t>Pinch</a:t>
+            </a:r>
+          </a:p>
+          <a:p>
+            <a:r>
+              <a:rPr lang="en-US" dirty="0" smtClean="0"/>
+              <a:t>Rotate</a:t>
+            </a:r>
+          </a:p>
+        </p:txBody>
+      </p:sp>
+      <p:sp>
+        <p:nvSpPr>
+          <p:cNvPr id="4" name="Rectangle 3"/>
+          <p:cNvSpPr/>
+          <p:nvPr/>
+        </p:nvSpPr>
+        <p:spPr>
+          <a:xfrm>
+            <a:off x="6516210" y="1704513"/>
+            <a:ext cx="4332303" cy="3835154"/>
+          </a:xfrm>
+          <a:prstGeom prst="rect">
+            <a:avLst/>
+          </a:prstGeom>
+        </p:spPr>
+        <p:style>
+          <a:lnRef idx="3">
+            <a:schemeClr val="lt1"/>
+          </a:lnRef>
+          <a:fillRef idx="1">
+            <a:schemeClr val="accent3"/>
+          </a:fillRef>
+          <a:effectRef idx="1">
+            <a:schemeClr val="accent3"/>
+          </a:effectRef>
+          <a:fontRef idx="minor">
+            <a:schemeClr val="lt1"/>
+          </a:fontRef>
+        </p:style>
+        <p:txBody>
+          <a:bodyPr rtlCol="0" anchor="ctr"/>
+          <a:lstStyle/>
+          <a:p>
+            <a:pPr algn="ctr"/>
+            <a:endParaRPr lang="en-US" dirty="0" smtClean="0"/>
+          </a:p>
+          <a:p>
+            <a:pPr algn="ctr"/>
+            <a:endParaRPr lang="en-US" dirty="0"/>
+          </a:p>
+          <a:p>
+            <a:pPr algn="ctr"/>
+            <a:endParaRPr lang="en-US" dirty="0" smtClean="0"/>
+          </a:p>
+          <a:p>
+            <a:pPr algn="ctr"/>
+            <a:endParaRPr lang="en-US" dirty="0"/>
+          </a:p>
+          <a:p>
+            <a:pPr algn="ctr"/>
+            <a:endParaRPr lang="en-US" dirty="0" smtClean="0"/>
+          </a:p>
+          <a:p>
+            <a:pPr algn="ctr"/>
+            <a:endParaRPr lang="en-US" dirty="0"/>
+          </a:p>
+          <a:p>
+            <a:pPr algn="ctr"/>
+            <a:endParaRPr lang="en-US" dirty="0" smtClean="0"/>
+          </a:p>
+          <a:p>
+            <a:pPr algn="ctr"/>
+            <a:endParaRPr lang="en-US" dirty="0"/>
+          </a:p>
+          <a:p>
+            <a:pPr algn="ctr"/>
+            <a:endParaRPr lang="en-US" dirty="0" smtClean="0"/>
+          </a:p>
+          <a:p>
+            <a:pPr algn="ctr"/>
+            <a:endParaRPr lang="en-US" dirty="0"/>
+          </a:p>
+          <a:p>
+            <a:pPr algn="ctr"/>
+            <a:endParaRPr lang="en-US" dirty="0" smtClean="0"/>
+          </a:p>
+          <a:p>
+            <a:pPr algn="ctr"/>
+            <a:endParaRPr lang="en-US" dirty="0"/>
+          </a:p>
+        </p:txBody>
+      </p:sp>
+      <p:sp>
+        <p:nvSpPr>
+          <p:cNvPr id="5" name="Oval 4"/>
+          <p:cNvSpPr/>
+          <p:nvPr/>
+        </p:nvSpPr>
+        <p:spPr>
+          <a:xfrm>
+            <a:off x="6871316" y="2041864"/>
+            <a:ext cx="319597" cy="319596"/>
+          </a:xfrm>
+          <a:prstGeom prst="ellipse">
+            <a:avLst/>
+          </a:prstGeom>
+        </p:spPr>
+        <p:style>
+          <a:lnRef idx="0">
+            <a:schemeClr val="accent2"/>
+          </a:lnRef>
+          <a:fillRef idx="3">
+            <a:schemeClr val="accent2"/>
+          </a:fillRef>
+          <a:effectRef idx="3">
+            <a:schemeClr val="accent2"/>
+          </a:effectRef>
+          <a:fontRef idx="minor">
+            <a:schemeClr val="lt1"/>
+          </a:fontRef>
+        </p:style>
+        <p:txBody>
+          <a:bodyPr rtlCol="0" anchor="ctr"/>
+          <a:lstStyle/>
+          <a:p>
+            <a:pPr algn="ctr"/>
+            <a:endParaRPr lang="en-US"/>
+          </a:p>
+        </p:txBody>
+      </p:sp>
+      <p:sp>
+        <p:nvSpPr>
+          <p:cNvPr id="7" name="Oval 6"/>
+          <p:cNvSpPr/>
+          <p:nvPr/>
+        </p:nvSpPr>
+        <p:spPr>
+          <a:xfrm>
+            <a:off x="10148656" y="4893076"/>
+            <a:ext cx="319597" cy="319596"/>
+          </a:xfrm>
+          <a:prstGeom prst="ellipse">
+            <a:avLst/>
+          </a:prstGeom>
+        </p:spPr>
+        <p:style>
+          <a:lnRef idx="0">
+            <a:schemeClr val="accent2"/>
+          </a:lnRef>
+          <a:fillRef idx="3">
+            <a:schemeClr val="accent2"/>
+          </a:fillRef>
+          <a:effectRef idx="3">
+            <a:schemeClr val="accent2"/>
+          </a:effectRef>
+          <a:fontRef idx="minor">
+            <a:schemeClr val="lt1"/>
+          </a:fontRef>
+        </p:style>
+        <p:txBody>
+          <a:bodyPr rtlCol="0" anchor="ctr"/>
+          <a:lstStyle/>
+          <a:p>
+            <a:pPr algn="ctr"/>
+            <a:endParaRPr lang="en-US"/>
+          </a:p>
+        </p:txBody>
+      </p:sp>
+      <p:sp>
+        <p:nvSpPr>
+          <p:cNvPr id="8" name="Oval 7"/>
+          <p:cNvSpPr/>
+          <p:nvPr/>
+        </p:nvSpPr>
+        <p:spPr>
+          <a:xfrm>
+            <a:off x="6871316" y="2041864"/>
+            <a:ext cx="319597" cy="319596"/>
+          </a:xfrm>
+          <a:prstGeom prst="ellipse">
+            <a:avLst/>
+          </a:prstGeom>
+        </p:spPr>
+        <p:style>
+          <a:lnRef idx="0">
+            <a:schemeClr val="accent2"/>
+          </a:lnRef>
+          <a:fillRef idx="3">
+            <a:schemeClr val="accent2"/>
+          </a:fillRef>
+          <a:effectRef idx="3">
+            <a:schemeClr val="accent2"/>
+          </a:effectRef>
+          <a:fontRef idx="minor">
+            <a:schemeClr val="lt1"/>
+          </a:fontRef>
+        </p:style>
+        <p:txBody>
+          <a:bodyPr rtlCol="0" anchor="ctr"/>
+          <a:lstStyle/>
+          <a:p>
+            <a:pPr algn="ctr"/>
+            <a:endParaRPr lang="en-US"/>
+          </a:p>
+        </p:txBody>
+      </p:sp>
+      <p:sp>
+        <p:nvSpPr>
+          <p:cNvPr id="9" name="Oval 8"/>
+          <p:cNvSpPr/>
+          <p:nvPr/>
+        </p:nvSpPr>
+        <p:spPr>
+          <a:xfrm>
+            <a:off x="6871316" y="3534792"/>
+            <a:ext cx="319597" cy="319596"/>
+          </a:xfrm>
+          <a:prstGeom prst="ellipse">
+            <a:avLst/>
+          </a:prstGeom>
+        </p:spPr>
+        <p:style>
+          <a:lnRef idx="0">
+            <a:schemeClr val="accent2"/>
+          </a:lnRef>
+          <a:fillRef idx="3">
+            <a:schemeClr val="accent2"/>
+          </a:fillRef>
+          <a:effectRef idx="3">
+            <a:schemeClr val="accent2"/>
+          </a:effectRef>
+          <a:fontRef idx="minor">
+            <a:schemeClr val="lt1"/>
+          </a:fontRef>
+        </p:style>
+        <p:txBody>
+          <a:bodyPr rtlCol="0" anchor="ctr"/>
+          <a:lstStyle/>
+          <a:p>
+            <a:pPr algn="ctr"/>
+            <a:endParaRPr lang="en-US"/>
+          </a:p>
+        </p:txBody>
+      </p:sp>
+      <p:sp>
+        <p:nvSpPr>
+          <p:cNvPr id="10" name="Oval 9"/>
+          <p:cNvSpPr/>
+          <p:nvPr/>
+        </p:nvSpPr>
+        <p:spPr>
+          <a:xfrm>
+            <a:off x="10148656" y="3605814"/>
+            <a:ext cx="319597" cy="319596"/>
+          </a:xfrm>
+          <a:prstGeom prst="ellipse">
+            <a:avLst/>
+          </a:prstGeom>
+        </p:spPr>
+        <p:style>
+          <a:lnRef idx="0">
+            <a:schemeClr val="accent2"/>
+          </a:lnRef>
+          <a:fillRef idx="3">
+            <a:schemeClr val="accent2"/>
+          </a:fillRef>
+          <a:effectRef idx="3">
+            <a:schemeClr val="accent2"/>
+          </a:effectRef>
+          <a:fontRef idx="minor">
+            <a:schemeClr val="lt1"/>
+          </a:fontRef>
+        </p:style>
+        <p:txBody>
+          <a:bodyPr rtlCol="0" anchor="ctr"/>
+          <a:lstStyle/>
+          <a:p>
+            <a:pPr algn="ctr"/>
+            <a:endParaRPr lang="en-US"/>
+          </a:p>
+        </p:txBody>
+      </p:sp>
+    </p:spTree>
+    <p:extLst>
+      <p:ext uri="{BB962C8B-B14F-4D97-AF65-F5344CB8AC3E}">
+        <p14:creationId xmlns:p14="http://schemas.microsoft.com/office/powerpoint/2010/main" val="3791024923"/>
+      </p:ext>
+    </p:extLst>
+  </p:cSld>
+  <p:clrMapOvr>
+    <a:masterClrMapping/>
+  </p:clrMapOvr>
+  <p:timing>
+    <p:tnLst>
+      <p:par>
+        <p:cTn id="1" dur="indefinite" restart="never" nodeType="tmRoot">
+          <p:childTnLst>
+            <p:seq concurrent="1" nextAc="seek">
+              <p:cTn id="2" dur="indefinite" nodeType="mainSeq">
+                <p:childTnLst>
+                  <p:par>
+                    <p:cTn id="3" fill="hold">
+                      <p:stCondLst>
+                        <p:cond delay="indefinite"/>
+                      </p:stCondLst>
+                      <p:childTnLst>
+                        <p:par>
+                          <p:cTn id="4" fill="hold">
+                            <p:stCondLst>
+                              <p:cond delay="0"/>
+                            </p:stCondLst>
+                            <p:childTnLst>
+                              <p:par>
+                                <p:cTn id="5" presetID="10" presetClass="entr" presetSubtype="0" fill="hold" grpId="0" nodeType="clickEffect">
+                                  <p:stCondLst>
+                                    <p:cond delay="0"/>
+                                  </p:stCondLst>
+                                  <p:childTnLst>
+                                    <p:set>
+                                      <p:cBhvr>
+                                        <p:cTn id="6" dur="1" fill="hold">
+                                          <p:stCondLst>
+                                            <p:cond delay="0"/>
+                                          </p:stCondLst>
+                                        </p:cTn>
+                                        <p:tgtEl>
+                                          <p:spTgt spid="3">
+                                            <p:txEl>
+                                              <p:pRg st="0" end="0"/>
+                                            </p:txEl>
+                                          </p:spTgt>
+                                        </p:tgtEl>
+                                        <p:attrNameLst>
+                                          <p:attrName>style.visibility</p:attrName>
+                                        </p:attrNameLst>
+                                      </p:cBhvr>
+                                      <p:to>
+                                        <p:strVal val="visible"/>
+                                      </p:to>
+                                    </p:set>
+                                    <p:animEffect transition="in" filter="fade">
+                                      <p:cBhvr>
+                                        <p:cTn id="7" dur="500"/>
+                                        <p:tgtEl>
+                                          <p:spTgt spid="3">
+                                            <p:txEl>
+                                              <p:pRg st="0" end="0"/>
+                                            </p:txEl>
+                                          </p:spTgt>
+                                        </p:tgtEl>
+                                      </p:cBhvr>
+                                    </p:animEffect>
+                                  </p:childTnLst>
+                                </p:cTn>
+                              </p:par>
+                            </p:childTnLst>
+                          </p:cTn>
+                        </p:par>
+                      </p:childTnLst>
+                    </p:cTn>
+                  </p:par>
+                  <p:par>
+                    <p:cTn id="8" fill="hold">
+                      <p:stCondLst>
+                        <p:cond delay="indefinite"/>
+                      </p:stCondLst>
+                      <p:childTnLst>
+                        <p:par>
+                          <p:cTn id="9" fill="hold">
+                            <p:stCondLst>
+                              <p:cond delay="0"/>
+                            </p:stCondLst>
+                            <p:childTnLst>
+                              <p:par>
+                                <p:cTn id="10" presetID="1" presetClass="entr" presetSubtype="0" fill="hold" grpId="0" nodeType="clickEffect">
+                                  <p:stCondLst>
+                                    <p:cond delay="0"/>
+                                  </p:stCondLst>
+                                  <p:childTnLst>
+                                    <p:set>
+                                      <p:cBhvr>
+                                        <p:cTn id="11" dur="1" fill="hold">
+                                          <p:stCondLst>
+                                            <p:cond delay="0"/>
+                                          </p:stCondLst>
+                                        </p:cTn>
+                                        <p:tgtEl>
+                                          <p:spTgt spid="5"/>
+                                        </p:tgtEl>
+                                        <p:attrNameLst>
+                                          <p:attrName>style.visibility</p:attrName>
+                                        </p:attrNameLst>
+                                      </p:cBhvr>
+                                      <p:to>
+                                        <p:strVal val="visible"/>
+                                      </p:to>
+                                    </p:set>
+                                  </p:childTnLst>
+                                </p:cTn>
+                              </p:par>
+                              <p:par>
+                                <p:cTn id="12" presetID="1" presetClass="exit" presetSubtype="0" fill="hold" grpId="1" nodeType="withEffect">
+                                  <p:stCondLst>
+                                    <p:cond delay="500"/>
+                                  </p:stCondLst>
+                                  <p:childTnLst>
+                                    <p:set>
+                                      <p:cBhvr>
+                                        <p:cTn id="13" dur="1" fill="hold">
+                                          <p:stCondLst>
+                                            <p:cond delay="0"/>
+                                          </p:stCondLst>
+                                        </p:cTn>
+                                        <p:tgtEl>
+                                          <p:spTgt spid="5"/>
+                                        </p:tgtEl>
+                                        <p:attrNameLst>
+                                          <p:attrName>style.visibility</p:attrName>
+                                        </p:attrNameLst>
+                                      </p:cBhvr>
+                                      <p:to>
+                                        <p:strVal val="hidden"/>
+                                      </p:to>
+                                    </p:set>
+                                  </p:childTnLst>
+                                </p:cTn>
+                              </p:par>
+                            </p:childTnLst>
+                          </p:cTn>
+                        </p:par>
+                      </p:childTnLst>
+                    </p:cTn>
+                  </p:par>
+                  <p:par>
+                    <p:cTn id="14" fill="hold">
+                      <p:stCondLst>
+                        <p:cond delay="indefinite"/>
+                      </p:stCondLst>
+                      <p:childTnLst>
+                        <p:par>
+                          <p:cTn id="15" fill="hold">
+                            <p:stCondLst>
+                              <p:cond delay="0"/>
+                            </p:stCondLst>
+                            <p:childTnLst>
+                              <p:par>
+                                <p:cTn id="16" presetID="10" presetClass="entr" presetSubtype="0" fill="hold" grpId="0" nodeType="clickEffect">
+                                  <p:stCondLst>
+                                    <p:cond delay="0"/>
+                                  </p:stCondLst>
+                                  <p:childTnLst>
+                                    <p:set>
+                                      <p:cBhvr>
+                                        <p:cTn id="17" dur="1" fill="hold">
+                                          <p:stCondLst>
+                                            <p:cond delay="0"/>
+                                          </p:stCondLst>
+                                        </p:cTn>
+                                        <p:tgtEl>
+                                          <p:spTgt spid="3">
+                                            <p:txEl>
+                                              <p:pRg st="1" end="1"/>
+                                            </p:txEl>
+                                          </p:spTgt>
+                                        </p:tgtEl>
+                                        <p:attrNameLst>
+                                          <p:attrName>style.visibility</p:attrName>
+                                        </p:attrNameLst>
+                                      </p:cBhvr>
+                                      <p:to>
+                                        <p:strVal val="visible"/>
+                                      </p:to>
+                                    </p:set>
+                                    <p:animEffect transition="in" filter="fade">
+                                      <p:cBhvr>
+                                        <p:cTn id="18" dur="500"/>
+                                        <p:tgtEl>
+                                          <p:spTgt spid="3">
+                                            <p:txEl>
+                                              <p:pRg st="1" end="1"/>
+                                            </p:txEl>
+                                          </p:spTgt>
+                                        </p:tgtEl>
+                                      </p:cBhvr>
+                                    </p:animEffect>
+                                  </p:childTnLst>
+                                </p:cTn>
+                              </p:par>
+                            </p:childTnLst>
+                          </p:cTn>
+                        </p:par>
+                      </p:childTnLst>
+                    </p:cTn>
+                  </p:par>
+                  <p:par>
+                    <p:cTn id="19" fill="hold">
+                      <p:stCondLst>
+                        <p:cond delay="indefinite"/>
+                      </p:stCondLst>
+                      <p:childTnLst>
+                        <p:par>
+                          <p:cTn id="20" fill="hold">
+                            <p:stCondLst>
+                              <p:cond delay="0"/>
+                            </p:stCondLst>
+                            <p:childTnLst>
+                              <p:par>
+                                <p:cTn id="21" presetID="10" presetClass="entr" presetSubtype="0" fill="hold" grpId="2" nodeType="clickEffect">
+                                  <p:stCondLst>
+                                    <p:cond delay="0"/>
+                                  </p:stCondLst>
+                                  <p:childTnLst>
+                                    <p:set>
+                                      <p:cBhvr>
+                                        <p:cTn id="22" dur="1" fill="hold">
+                                          <p:stCondLst>
+                                            <p:cond delay="0"/>
+                                          </p:stCondLst>
+                                        </p:cTn>
+                                        <p:tgtEl>
+                                          <p:spTgt spid="5"/>
+                                        </p:tgtEl>
+                                        <p:attrNameLst>
+                                          <p:attrName>style.visibility</p:attrName>
+                                        </p:attrNameLst>
+                                      </p:cBhvr>
+                                      <p:to>
+                                        <p:strVal val="visible"/>
+                                      </p:to>
+                                    </p:set>
+                                    <p:animEffect transition="in" filter="fade">
+                                      <p:cBhvr>
+                                        <p:cTn id="23" dur="500"/>
+                                        <p:tgtEl>
+                                          <p:spTgt spid="5"/>
+                                        </p:tgtEl>
+                                      </p:cBhvr>
+                                    </p:animEffect>
+                                  </p:childTnLst>
+                                </p:cTn>
+                              </p:par>
+                            </p:childTnLst>
+                          </p:cTn>
+                        </p:par>
+                      </p:childTnLst>
+                    </p:cTn>
+                  </p:par>
+                  <p:par>
+                    <p:cTn id="24" fill="hold">
+                      <p:stCondLst>
+                        <p:cond delay="indefinite"/>
+                      </p:stCondLst>
+                      <p:childTnLst>
+                        <p:par>
+                          <p:cTn id="25" fill="hold">
+                            <p:stCondLst>
+                              <p:cond delay="0"/>
+                            </p:stCondLst>
+                            <p:childTnLst>
+                              <p:par>
+                                <p:cTn id="26" presetID="10" presetClass="exit" presetSubtype="0" fill="hold" grpId="3" nodeType="clickEffect">
+                                  <p:stCondLst>
+                                    <p:cond delay="0"/>
+                                  </p:stCondLst>
+                                  <p:childTnLst>
+                                    <p:animEffect transition="out" filter="fade">
+                                      <p:cBhvr>
+                                        <p:cTn id="27" dur="500"/>
+                                        <p:tgtEl>
+                                          <p:spTgt spid="5"/>
+                                        </p:tgtEl>
+                                      </p:cBhvr>
+                                    </p:animEffect>
+                                    <p:set>
+                                      <p:cBhvr>
+                                        <p:cTn id="28" dur="1" fill="hold">
+                                          <p:stCondLst>
+                                            <p:cond delay="499"/>
+                                          </p:stCondLst>
+                                        </p:cTn>
+                                        <p:tgtEl>
+                                          <p:spTgt spid="5"/>
+                                        </p:tgtEl>
+                                        <p:attrNameLst>
+                                          <p:attrName>style.visibility</p:attrName>
+                                        </p:attrNameLst>
+                                      </p:cBhvr>
+                                      <p:to>
+                                        <p:strVal val="hidden"/>
+                                      </p:to>
+                                    </p:set>
+                                  </p:childTnLst>
+                                </p:cTn>
+                              </p:par>
+                            </p:childTnLst>
+                          </p:cTn>
+                        </p:par>
+                      </p:childTnLst>
+                    </p:cTn>
+                  </p:par>
+                  <p:par>
+                    <p:cTn id="29" fill="hold">
+                      <p:stCondLst>
+                        <p:cond delay="indefinite"/>
+                      </p:stCondLst>
+                      <p:childTnLst>
+                        <p:par>
+                          <p:cTn id="30" fill="hold">
+                            <p:stCondLst>
+                              <p:cond delay="0"/>
+                            </p:stCondLst>
+                            <p:childTnLst>
+                              <p:par>
+                                <p:cTn id="31" presetID="10" presetClass="entr" presetSubtype="0" fill="hold" grpId="0" nodeType="clickEffect">
+                                  <p:stCondLst>
+                                    <p:cond delay="0"/>
+                                  </p:stCondLst>
+                                  <p:childTnLst>
+                                    <p:set>
+                                      <p:cBhvr>
+                                        <p:cTn id="32" dur="1" fill="hold">
+                                          <p:stCondLst>
+                                            <p:cond delay="0"/>
+                                          </p:stCondLst>
+                                        </p:cTn>
+                                        <p:tgtEl>
+                                          <p:spTgt spid="3">
+                                            <p:txEl>
+                                              <p:pRg st="2" end="2"/>
+                                            </p:txEl>
+                                          </p:spTgt>
+                                        </p:tgtEl>
+                                        <p:attrNameLst>
+                                          <p:attrName>style.visibility</p:attrName>
+                                        </p:attrNameLst>
+                                      </p:cBhvr>
+                                      <p:to>
+                                        <p:strVal val="visible"/>
+                                      </p:to>
+                                    </p:set>
+                                    <p:animEffect transition="in" filter="fade">
+                                      <p:cBhvr>
+                                        <p:cTn id="33" dur="500"/>
+                                        <p:tgtEl>
+                                          <p:spTgt spid="3">
+                                            <p:txEl>
+                                              <p:pRg st="2" end="2"/>
+                                            </p:txEl>
+                                          </p:spTgt>
+                                        </p:tgtEl>
+                                      </p:cBhvr>
+                                    </p:animEffect>
+                                  </p:childTnLst>
+                                </p:cTn>
+                              </p:par>
+                            </p:childTnLst>
+                          </p:cTn>
+                        </p:par>
+                      </p:childTnLst>
+                    </p:cTn>
+                  </p:par>
+                  <p:par>
+                    <p:cTn id="34" fill="hold">
+                      <p:stCondLst>
+                        <p:cond delay="indefinite"/>
+                      </p:stCondLst>
+                      <p:childTnLst>
+                        <p:par>
+                          <p:cTn id="35" fill="hold">
+                            <p:stCondLst>
+                              <p:cond delay="0"/>
+                            </p:stCondLst>
+                            <p:childTnLst>
+                              <p:par>
+                                <p:cTn id="36" presetID="10" presetClass="entr" presetSubtype="0" fill="hold" grpId="6" nodeType="clickEffect">
+                                  <p:stCondLst>
+                                    <p:cond delay="0"/>
+                                  </p:stCondLst>
+                                  <p:childTnLst>
+                                    <p:set>
+                                      <p:cBhvr>
+                                        <p:cTn id="37" dur="1" fill="hold">
+                                          <p:stCondLst>
+                                            <p:cond delay="0"/>
+                                          </p:stCondLst>
+                                        </p:cTn>
+                                        <p:tgtEl>
+                                          <p:spTgt spid="5"/>
+                                        </p:tgtEl>
+                                        <p:attrNameLst>
+                                          <p:attrName>style.visibility</p:attrName>
+                                        </p:attrNameLst>
+                                      </p:cBhvr>
+                                      <p:to>
+                                        <p:strVal val="visible"/>
+                                      </p:to>
+                                    </p:set>
+                                    <p:animEffect transition="in" filter="fade">
+                                      <p:cBhvr>
+                                        <p:cTn id="38" dur="500"/>
+                                        <p:tgtEl>
+                                          <p:spTgt spid="5"/>
+                                        </p:tgtEl>
+                                      </p:cBhvr>
+                                    </p:animEffect>
+                                  </p:childTnLst>
+                                </p:cTn>
+                              </p:par>
+                              <p:par>
+                                <p:cTn id="39" presetID="42" presetClass="path" presetSubtype="0" fill="hold" grpId="4" nodeType="withEffect">
+                                  <p:stCondLst>
+                                    <p:cond delay="300"/>
+                                  </p:stCondLst>
+                                  <p:childTnLst>
+                                    <p:animMotion origin="layout" path="M -2.70833E-6 -4.81481E-6 L 0.27383 0.00255 " pathEditMode="relative" rAng="0" ptsTypes="AA">
+                                      <p:cBhvr>
+                                        <p:cTn id="40" dur="3000" fill="hold"/>
+                                        <p:tgtEl>
+                                          <p:spTgt spid="5"/>
+                                        </p:tgtEl>
+                                        <p:attrNameLst>
+                                          <p:attrName>ppt_x</p:attrName>
+                                          <p:attrName>ppt_y</p:attrName>
+                                        </p:attrNameLst>
+                                      </p:cBhvr>
+                                      <p:rCtr x="13685" y="116"/>
+                                    </p:animMotion>
+                                  </p:childTnLst>
+                                </p:cTn>
+                              </p:par>
+                            </p:childTnLst>
+                          </p:cTn>
+                        </p:par>
+                      </p:childTnLst>
+                    </p:cTn>
+                  </p:par>
+                  <p:par>
+                    <p:cTn id="41" fill="hold">
+                      <p:stCondLst>
+                        <p:cond delay="indefinite"/>
+                      </p:stCondLst>
+                      <p:childTnLst>
+                        <p:par>
+                          <p:cTn id="42" fill="hold">
+                            <p:stCondLst>
+                              <p:cond delay="0"/>
+                            </p:stCondLst>
+                            <p:childTnLst>
+                              <p:par>
+                                <p:cTn id="43" presetID="10" presetClass="exit" presetSubtype="0" fill="hold" grpId="9" nodeType="clickEffect">
+                                  <p:stCondLst>
+                                    <p:cond delay="0"/>
+                                  </p:stCondLst>
+                                  <p:childTnLst>
+                                    <p:animEffect transition="out" filter="fade">
+                                      <p:cBhvr>
+                                        <p:cTn id="44" dur="500"/>
+                                        <p:tgtEl>
+                                          <p:spTgt spid="5"/>
+                                        </p:tgtEl>
+                                      </p:cBhvr>
+                                    </p:animEffect>
+                                    <p:set>
+                                      <p:cBhvr>
+                                        <p:cTn id="45" dur="1" fill="hold">
+                                          <p:stCondLst>
+                                            <p:cond delay="499"/>
+                                          </p:stCondLst>
+                                        </p:cTn>
+                                        <p:tgtEl>
+                                          <p:spTgt spid="5"/>
+                                        </p:tgtEl>
+                                        <p:attrNameLst>
+                                          <p:attrName>style.visibility</p:attrName>
+                                        </p:attrNameLst>
+                                      </p:cBhvr>
+                                      <p:to>
+                                        <p:strVal val="hidden"/>
+                                      </p:to>
+                                    </p:set>
+                                  </p:childTnLst>
+                                </p:cTn>
+                              </p:par>
+                            </p:childTnLst>
+                          </p:cTn>
+                        </p:par>
+                      </p:childTnLst>
+                    </p:cTn>
+                  </p:par>
+                  <p:par>
+                    <p:cTn id="46" fill="hold">
+                      <p:stCondLst>
+                        <p:cond delay="indefinite"/>
+                      </p:stCondLst>
+                      <p:childTnLst>
+                        <p:par>
+                          <p:cTn id="47" fill="hold">
+                            <p:stCondLst>
+                              <p:cond delay="0"/>
+                            </p:stCondLst>
+                            <p:childTnLst>
+                              <p:par>
+                                <p:cTn id="48" presetID="10" presetClass="entr" presetSubtype="0" fill="hold" grpId="0" nodeType="clickEffect">
+                                  <p:stCondLst>
+                                    <p:cond delay="0"/>
+                                  </p:stCondLst>
+                                  <p:childTnLst>
+                                    <p:set>
+                                      <p:cBhvr>
+                                        <p:cTn id="49" dur="1" fill="hold">
+                                          <p:stCondLst>
+                                            <p:cond delay="0"/>
+                                          </p:stCondLst>
+                                        </p:cTn>
+                                        <p:tgtEl>
+                                          <p:spTgt spid="3">
+                                            <p:txEl>
+                                              <p:pRg st="3" end="3"/>
+                                            </p:txEl>
+                                          </p:spTgt>
+                                        </p:tgtEl>
+                                        <p:attrNameLst>
+                                          <p:attrName>style.visibility</p:attrName>
+                                        </p:attrNameLst>
+                                      </p:cBhvr>
+                                      <p:to>
+                                        <p:strVal val="visible"/>
+                                      </p:to>
+                                    </p:set>
+                                    <p:animEffect transition="in" filter="fade">
+                                      <p:cBhvr>
+                                        <p:cTn id="50" dur="500"/>
+                                        <p:tgtEl>
+                                          <p:spTgt spid="3">
+                                            <p:txEl>
+                                              <p:pRg st="3" end="3"/>
+                                            </p:txEl>
+                                          </p:spTgt>
+                                        </p:tgtEl>
+                                      </p:cBhvr>
+                                    </p:animEffect>
+                                  </p:childTnLst>
+                                </p:cTn>
+                              </p:par>
+                            </p:childTnLst>
+                          </p:cTn>
+                        </p:par>
+                      </p:childTnLst>
+                    </p:cTn>
+                  </p:par>
+                  <p:par>
+                    <p:cTn id="51" fill="hold">
+                      <p:stCondLst>
+                        <p:cond delay="indefinite"/>
+                      </p:stCondLst>
+                      <p:childTnLst>
+                        <p:par>
+                          <p:cTn id="52" fill="hold">
+                            <p:stCondLst>
+                              <p:cond delay="0"/>
+                            </p:stCondLst>
+                            <p:childTnLst>
+                              <p:par>
+                                <p:cTn id="53" presetID="10" presetClass="entr" presetSubtype="0" fill="hold" grpId="6" nodeType="clickEffect">
+                                  <p:stCondLst>
+                                    <p:cond delay="0"/>
+                                  </p:stCondLst>
+                                  <p:childTnLst>
+                                    <p:set>
+                                      <p:cBhvr>
+                                        <p:cTn id="54" dur="1" fill="hold">
+                                          <p:stCondLst>
+                                            <p:cond delay="0"/>
+                                          </p:stCondLst>
+                                        </p:cTn>
+                                        <p:tgtEl>
+                                          <p:spTgt spid="8"/>
+                                        </p:tgtEl>
+                                        <p:attrNameLst>
+                                          <p:attrName>style.visibility</p:attrName>
+                                        </p:attrNameLst>
+                                      </p:cBhvr>
+                                      <p:to>
+                                        <p:strVal val="visible"/>
+                                      </p:to>
+                                    </p:set>
+                                    <p:animEffect transition="in" filter="fade">
+                                      <p:cBhvr>
+                                        <p:cTn id="55" dur="500"/>
+                                        <p:tgtEl>
+                                          <p:spTgt spid="8"/>
+                                        </p:tgtEl>
+                                      </p:cBhvr>
+                                    </p:animEffect>
+                                  </p:childTnLst>
+                                </p:cTn>
+                              </p:par>
+                              <p:par>
+                                <p:cTn id="56" presetID="42" presetClass="path" presetSubtype="0" fill="hold" grpId="4" nodeType="withEffect">
+                                  <p:stCondLst>
+                                    <p:cond delay="100"/>
+                                  </p:stCondLst>
+                                  <p:childTnLst>
+                                    <p:animMotion origin="layout" path="M -2.70833E-6 -4.81481E-6 L 0.27383 0.00255 " pathEditMode="relative" rAng="0" ptsTypes="AA">
+                                      <p:cBhvr>
+                                        <p:cTn id="57" dur="1000" fill="hold"/>
+                                        <p:tgtEl>
+                                          <p:spTgt spid="8"/>
+                                        </p:tgtEl>
+                                        <p:attrNameLst>
+                                          <p:attrName>ppt_x</p:attrName>
+                                          <p:attrName>ppt_y</p:attrName>
+                                        </p:attrNameLst>
+                                      </p:cBhvr>
+                                      <p:rCtr x="13685" y="116"/>
+                                    </p:animMotion>
+                                  </p:childTnLst>
+                                </p:cTn>
+                              </p:par>
+                            </p:childTnLst>
+                          </p:cTn>
+                        </p:par>
+                      </p:childTnLst>
+                    </p:cTn>
+                  </p:par>
+                  <p:par>
+                    <p:cTn id="58" fill="hold">
+                      <p:stCondLst>
+                        <p:cond delay="indefinite"/>
+                      </p:stCondLst>
+                      <p:childTnLst>
+                        <p:par>
+                          <p:cTn id="59" fill="hold">
+                            <p:stCondLst>
+                              <p:cond delay="0"/>
+                            </p:stCondLst>
+                            <p:childTnLst>
+                              <p:par>
+                                <p:cTn id="60" presetID="10" presetClass="exit" presetSubtype="0" fill="hold" grpId="9" nodeType="clickEffect">
+                                  <p:stCondLst>
+                                    <p:cond delay="0"/>
+                                  </p:stCondLst>
+                                  <p:childTnLst>
+                                    <p:animEffect transition="out" filter="fade">
+                                      <p:cBhvr>
+                                        <p:cTn id="61" dur="500"/>
+                                        <p:tgtEl>
+                                          <p:spTgt spid="8"/>
+                                        </p:tgtEl>
+                                      </p:cBhvr>
+                                    </p:animEffect>
+                                    <p:set>
+                                      <p:cBhvr>
+                                        <p:cTn id="62" dur="1" fill="hold">
+                                          <p:stCondLst>
+                                            <p:cond delay="499"/>
+                                          </p:stCondLst>
+                                        </p:cTn>
+                                        <p:tgtEl>
+                                          <p:spTgt spid="8"/>
+                                        </p:tgtEl>
+                                        <p:attrNameLst>
+                                          <p:attrName>style.visibility</p:attrName>
+                                        </p:attrNameLst>
+                                      </p:cBhvr>
+                                      <p:to>
+                                        <p:strVal val="hidden"/>
+                                      </p:to>
+                                    </p:set>
+                                  </p:childTnLst>
+                                </p:cTn>
+                              </p:par>
+                            </p:childTnLst>
+                          </p:cTn>
+                        </p:par>
+                      </p:childTnLst>
+                    </p:cTn>
+                  </p:par>
+                  <p:par>
+                    <p:cTn id="63" fill="hold">
+                      <p:stCondLst>
+                        <p:cond delay="indefinite"/>
+                      </p:stCondLst>
+                      <p:childTnLst>
+                        <p:par>
+                          <p:cTn id="64" fill="hold">
+                            <p:stCondLst>
+                              <p:cond delay="0"/>
+                            </p:stCondLst>
+                            <p:childTnLst>
+                              <p:par>
+                                <p:cTn id="65" presetID="10" presetClass="entr" presetSubtype="0" fill="hold" grpId="0" nodeType="clickEffect">
+                                  <p:stCondLst>
+                                    <p:cond delay="0"/>
+                                  </p:stCondLst>
+                                  <p:childTnLst>
+                                    <p:set>
+                                      <p:cBhvr>
+                                        <p:cTn id="66" dur="1" fill="hold">
+                                          <p:stCondLst>
+                                            <p:cond delay="0"/>
+                                          </p:stCondLst>
+                                        </p:cTn>
+                                        <p:tgtEl>
+                                          <p:spTgt spid="3">
+                                            <p:txEl>
+                                              <p:pRg st="4" end="4"/>
+                                            </p:txEl>
+                                          </p:spTgt>
+                                        </p:tgtEl>
+                                        <p:attrNameLst>
+                                          <p:attrName>style.visibility</p:attrName>
+                                        </p:attrNameLst>
+                                      </p:cBhvr>
+                                      <p:to>
+                                        <p:strVal val="visible"/>
+                                      </p:to>
+                                    </p:set>
+                                    <p:animEffect transition="in" filter="fade">
+                                      <p:cBhvr>
+                                        <p:cTn id="67" dur="500"/>
+                                        <p:tgtEl>
+                                          <p:spTgt spid="3">
+                                            <p:txEl>
+                                              <p:pRg st="4" end="4"/>
+                                            </p:txEl>
+                                          </p:spTgt>
+                                        </p:tgtEl>
+                                      </p:cBhvr>
+                                    </p:animEffect>
+                                  </p:childTnLst>
+                                </p:cTn>
+                              </p:par>
+                            </p:childTnLst>
+                          </p:cTn>
+                        </p:par>
+                      </p:childTnLst>
+                    </p:cTn>
+                  </p:par>
+                  <p:par>
+                    <p:cTn id="68" fill="hold">
+                      <p:stCondLst>
+                        <p:cond delay="indefinite"/>
+                      </p:stCondLst>
+                      <p:childTnLst>
+                        <p:par>
+                          <p:cTn id="69" fill="hold">
+                            <p:stCondLst>
+                              <p:cond delay="0"/>
+                            </p:stCondLst>
+                            <p:childTnLst>
+                              <p:par>
+                                <p:cTn id="70" presetID="10" presetClass="entr" presetSubtype="0" fill="hold" grpId="10" nodeType="clickEffect">
+                                  <p:stCondLst>
+                                    <p:cond delay="0"/>
+                                  </p:stCondLst>
+                                  <p:childTnLst>
+                                    <p:set>
+                                      <p:cBhvr>
+                                        <p:cTn id="71" dur="1" fill="hold">
+                                          <p:stCondLst>
+                                            <p:cond delay="0"/>
+                                          </p:stCondLst>
+                                        </p:cTn>
+                                        <p:tgtEl>
+                                          <p:spTgt spid="5"/>
+                                        </p:tgtEl>
+                                        <p:attrNameLst>
+                                          <p:attrName>style.visibility</p:attrName>
+                                        </p:attrNameLst>
+                                      </p:cBhvr>
+                                      <p:to>
+                                        <p:strVal val="visible"/>
+                                      </p:to>
+                                    </p:set>
+                                    <p:animEffect transition="in" filter="fade">
+                                      <p:cBhvr>
+                                        <p:cTn id="72" dur="500"/>
+                                        <p:tgtEl>
+                                          <p:spTgt spid="5"/>
+                                        </p:tgtEl>
+                                      </p:cBhvr>
+                                    </p:animEffect>
+                                  </p:childTnLst>
+                                </p:cTn>
+                              </p:par>
+                              <p:par>
+                                <p:cTn id="73" presetID="10" presetClass="entr" presetSubtype="0" fill="hold" grpId="0" nodeType="withEffect">
+                                  <p:stCondLst>
+                                    <p:cond delay="0"/>
+                                  </p:stCondLst>
+                                  <p:childTnLst>
+                                    <p:set>
+                                      <p:cBhvr>
+                                        <p:cTn id="74" dur="1" fill="hold">
+                                          <p:stCondLst>
+                                            <p:cond delay="0"/>
+                                          </p:stCondLst>
+                                        </p:cTn>
+                                        <p:tgtEl>
+                                          <p:spTgt spid="7"/>
+                                        </p:tgtEl>
+                                        <p:attrNameLst>
+                                          <p:attrName>style.visibility</p:attrName>
+                                        </p:attrNameLst>
+                                      </p:cBhvr>
+                                      <p:to>
+                                        <p:strVal val="visible"/>
+                                      </p:to>
+                                    </p:set>
+                                    <p:animEffect transition="in" filter="fade">
+                                      <p:cBhvr>
+                                        <p:cTn id="75" dur="500"/>
+                                        <p:tgtEl>
+                                          <p:spTgt spid="7"/>
+                                        </p:tgtEl>
+                                      </p:cBhvr>
+                                    </p:animEffect>
+                                  </p:childTnLst>
+                                </p:cTn>
+                              </p:par>
+                              <p:par>
+                                <p:cTn id="76" presetID="42" presetClass="path" presetSubtype="0" accel="50000" decel="50000" fill="hold" grpId="11" nodeType="withEffect">
+                                  <p:stCondLst>
+                                    <p:cond delay="0"/>
+                                  </p:stCondLst>
+                                  <p:childTnLst>
+                                    <p:animMotion origin="layout" path="M -2.70833E-6 -4.81481E-6 L 0.08308 0.13936 " pathEditMode="relative" rAng="0" ptsTypes="AA">
+                                      <p:cBhvr>
+                                        <p:cTn id="77" dur="2000" fill="hold"/>
+                                        <p:tgtEl>
+                                          <p:spTgt spid="5"/>
+                                        </p:tgtEl>
+                                        <p:attrNameLst>
+                                          <p:attrName>ppt_x</p:attrName>
+                                          <p:attrName>ppt_y</p:attrName>
+                                        </p:attrNameLst>
+                                      </p:cBhvr>
+                                      <p:rCtr x="4154" y="6968"/>
+                                    </p:animMotion>
+                                  </p:childTnLst>
+                                </p:cTn>
+                              </p:par>
+                              <p:par>
+                                <p:cTn id="78" presetID="42" presetClass="path" presetSubtype="0" accel="50000" decel="50000" fill="hold" grpId="1" nodeType="withEffect">
+                                  <p:stCondLst>
+                                    <p:cond delay="0"/>
+                                  </p:stCondLst>
+                                  <p:childTnLst>
+                                    <p:animMotion origin="layout" path="M -2.70833E-6 4.44444E-6 L -0.1013 -0.14792 " pathEditMode="relative" rAng="0" ptsTypes="AA">
+                                      <p:cBhvr>
+                                        <p:cTn id="79" dur="2000" fill="hold"/>
+                                        <p:tgtEl>
+                                          <p:spTgt spid="7"/>
+                                        </p:tgtEl>
+                                        <p:attrNameLst>
+                                          <p:attrName>ppt_x</p:attrName>
+                                          <p:attrName>ppt_y</p:attrName>
+                                        </p:attrNameLst>
+                                      </p:cBhvr>
+                                      <p:rCtr x="-5065" y="-7407"/>
+                                    </p:animMotion>
+                                  </p:childTnLst>
+                                </p:cTn>
+                              </p:par>
+                            </p:childTnLst>
+                          </p:cTn>
+                        </p:par>
+                      </p:childTnLst>
+                    </p:cTn>
+                  </p:par>
+                  <p:par>
+                    <p:cTn id="80" fill="hold">
+                      <p:stCondLst>
+                        <p:cond delay="indefinite"/>
+                      </p:stCondLst>
+                      <p:childTnLst>
+                        <p:par>
+                          <p:cTn id="81" fill="hold">
+                            <p:stCondLst>
+                              <p:cond delay="0"/>
+                            </p:stCondLst>
+                            <p:childTnLst>
+                              <p:par>
+                                <p:cTn id="82" presetID="10" presetClass="exit" presetSubtype="0" fill="hold" grpId="12" nodeType="clickEffect">
+                                  <p:stCondLst>
+                                    <p:cond delay="0"/>
+                                  </p:stCondLst>
+                                  <p:childTnLst>
+                                    <p:animEffect transition="out" filter="fade">
+                                      <p:cBhvr>
+                                        <p:cTn id="83" dur="500"/>
+                                        <p:tgtEl>
+                                          <p:spTgt spid="5"/>
+                                        </p:tgtEl>
+                                      </p:cBhvr>
+                                    </p:animEffect>
+                                    <p:set>
+                                      <p:cBhvr>
+                                        <p:cTn id="84" dur="1" fill="hold">
+                                          <p:stCondLst>
+                                            <p:cond delay="499"/>
+                                          </p:stCondLst>
+                                        </p:cTn>
+                                        <p:tgtEl>
+                                          <p:spTgt spid="5"/>
+                                        </p:tgtEl>
+                                        <p:attrNameLst>
+                                          <p:attrName>style.visibility</p:attrName>
+                                        </p:attrNameLst>
+                                      </p:cBhvr>
+                                      <p:to>
+                                        <p:strVal val="hidden"/>
+                                      </p:to>
+                                    </p:set>
+                                  </p:childTnLst>
+                                </p:cTn>
+                              </p:par>
+                              <p:par>
+                                <p:cTn id="85" presetID="10" presetClass="exit" presetSubtype="0" fill="hold" grpId="2" nodeType="withEffect">
+                                  <p:stCondLst>
+                                    <p:cond delay="0"/>
+                                  </p:stCondLst>
+                                  <p:childTnLst>
+                                    <p:animEffect transition="out" filter="fade">
+                                      <p:cBhvr>
+                                        <p:cTn id="86" dur="500"/>
+                                        <p:tgtEl>
+                                          <p:spTgt spid="7"/>
+                                        </p:tgtEl>
+                                      </p:cBhvr>
+                                    </p:animEffect>
+                                    <p:set>
+                                      <p:cBhvr>
+                                        <p:cTn id="87" dur="1" fill="hold">
+                                          <p:stCondLst>
+                                            <p:cond delay="499"/>
+                                          </p:stCondLst>
+                                        </p:cTn>
+                                        <p:tgtEl>
+                                          <p:spTgt spid="7"/>
+                                        </p:tgtEl>
+                                        <p:attrNameLst>
+                                          <p:attrName>style.visibility</p:attrName>
+                                        </p:attrNameLst>
+                                      </p:cBhvr>
+                                      <p:to>
+                                        <p:strVal val="hidden"/>
+                                      </p:to>
+                                    </p:set>
+                                  </p:childTnLst>
+                                </p:cTn>
+                              </p:par>
+                            </p:childTnLst>
+                          </p:cTn>
+                        </p:par>
+                      </p:childTnLst>
+                    </p:cTn>
+                  </p:par>
+                  <p:par>
+                    <p:cTn id="88" fill="hold">
+                      <p:stCondLst>
+                        <p:cond delay="indefinite"/>
+                      </p:stCondLst>
+                      <p:childTnLst>
+                        <p:par>
+                          <p:cTn id="89" fill="hold">
+                            <p:stCondLst>
+                              <p:cond delay="0"/>
+                            </p:stCondLst>
+                            <p:childTnLst>
+                              <p:par>
+                                <p:cTn id="90" presetID="10" presetClass="entr" presetSubtype="0" fill="hold" grpId="0" nodeType="clickEffect">
+                                  <p:stCondLst>
+                                    <p:cond delay="0"/>
+                                  </p:stCondLst>
+                                  <p:childTnLst>
+                                    <p:set>
+                                      <p:cBhvr>
+                                        <p:cTn id="91" dur="1" fill="hold">
+                                          <p:stCondLst>
+                                            <p:cond delay="0"/>
+                                          </p:stCondLst>
+                                        </p:cTn>
+                                        <p:tgtEl>
+                                          <p:spTgt spid="3">
+                                            <p:txEl>
+                                              <p:pRg st="5" end="5"/>
+                                            </p:txEl>
+                                          </p:spTgt>
+                                        </p:tgtEl>
+                                        <p:attrNameLst>
+                                          <p:attrName>style.visibility</p:attrName>
+                                        </p:attrNameLst>
+                                      </p:cBhvr>
+                                      <p:to>
+                                        <p:strVal val="visible"/>
+                                      </p:to>
+                                    </p:set>
+                                    <p:animEffect transition="in" filter="fade">
+                                      <p:cBhvr>
+                                        <p:cTn id="92" dur="500"/>
+                                        <p:tgtEl>
+                                          <p:spTgt spid="3">
+                                            <p:txEl>
+                                              <p:pRg st="5" end="5"/>
+                                            </p:txEl>
+                                          </p:spTgt>
+                                        </p:tgtEl>
+                                      </p:cBhvr>
+                                    </p:animEffect>
+                                  </p:childTnLst>
+                                </p:cTn>
+                              </p:par>
+                            </p:childTnLst>
+                          </p:cTn>
+                        </p:par>
+                      </p:childTnLst>
+                    </p:cTn>
+                  </p:par>
+                  <p:par>
+                    <p:cTn id="93" fill="hold">
+                      <p:stCondLst>
+                        <p:cond delay="indefinite"/>
+                      </p:stCondLst>
+                      <p:childTnLst>
+                        <p:par>
+                          <p:cTn id="94" fill="hold">
+                            <p:stCondLst>
+                              <p:cond delay="0"/>
+                            </p:stCondLst>
+                            <p:childTnLst>
+                              <p:par>
+                                <p:cTn id="95" presetID="10" presetClass="entr" presetSubtype="0" fill="hold" grpId="1" nodeType="clickEffect">
+                                  <p:stCondLst>
+                                    <p:cond delay="0"/>
+                                  </p:stCondLst>
+                                  <p:childTnLst>
+                                    <p:set>
+                                      <p:cBhvr>
+                                        <p:cTn id="96" dur="1" fill="hold">
+                                          <p:stCondLst>
+                                            <p:cond delay="0"/>
+                                          </p:stCondLst>
+                                        </p:cTn>
+                                        <p:tgtEl>
+                                          <p:spTgt spid="9"/>
+                                        </p:tgtEl>
+                                        <p:attrNameLst>
+                                          <p:attrName>style.visibility</p:attrName>
+                                        </p:attrNameLst>
+                                      </p:cBhvr>
+                                      <p:to>
+                                        <p:strVal val="visible"/>
+                                      </p:to>
+                                    </p:set>
+                                    <p:animEffect transition="in" filter="fade">
+                                      <p:cBhvr>
+                                        <p:cTn id="97" dur="500"/>
+                                        <p:tgtEl>
+                                          <p:spTgt spid="9"/>
+                                        </p:tgtEl>
+                                      </p:cBhvr>
+                                    </p:animEffect>
+                                  </p:childTnLst>
+                                </p:cTn>
+                              </p:par>
+                            </p:childTnLst>
+                          </p:cTn>
+                        </p:par>
+                      </p:childTnLst>
+                    </p:cTn>
+                  </p:par>
+                  <p:par>
+                    <p:cTn id="98" fill="hold">
+                      <p:stCondLst>
+                        <p:cond delay="indefinite"/>
+                      </p:stCondLst>
+                      <p:childTnLst>
+                        <p:par>
+                          <p:cTn id="99" fill="hold">
+                            <p:stCondLst>
+                              <p:cond delay="0"/>
+                            </p:stCondLst>
+                            <p:childTnLst>
+                              <p:par>
+                                <p:cTn id="100" presetID="10" presetClass="entr" presetSubtype="0" fill="hold" grpId="0" nodeType="clickEffect">
+                                  <p:stCondLst>
+                                    <p:cond delay="0"/>
+                                  </p:stCondLst>
+                                  <p:childTnLst>
+                                    <p:set>
+                                      <p:cBhvr>
+                                        <p:cTn id="101" dur="1" fill="hold">
+                                          <p:stCondLst>
+                                            <p:cond delay="0"/>
+                                          </p:stCondLst>
+                                        </p:cTn>
+                                        <p:tgtEl>
+                                          <p:spTgt spid="10"/>
+                                        </p:tgtEl>
+                                        <p:attrNameLst>
+                                          <p:attrName>style.visibility</p:attrName>
+                                        </p:attrNameLst>
+                                      </p:cBhvr>
+                                      <p:to>
+                                        <p:strVal val="visible"/>
+                                      </p:to>
+                                    </p:set>
+                                    <p:animEffect transition="in" filter="fade">
+                                      <p:cBhvr>
+                                        <p:cTn id="102" dur="500"/>
+                                        <p:tgtEl>
+                                          <p:spTgt spid="10"/>
+                                        </p:tgtEl>
+                                      </p:cBhvr>
+                                    </p:animEffect>
+                                  </p:childTnLst>
+                                </p:cTn>
+                              </p:par>
+                              <p:par>
+                                <p:cTn id="103" presetID="37" presetClass="path" presetSubtype="0" fill="hold" grpId="3" nodeType="withEffect">
+                                  <p:stCondLst>
+                                    <p:cond delay="0"/>
+                                  </p:stCondLst>
+                                  <p:childTnLst>
+                                    <p:animMotion origin="layout" path="M 3.95833E-6 3.7037E-7 L 0.07239 0.13148 C 0.0875 0.16111 0.11015 0.17755 0.13385 0.17755 C 0.16093 0.17755 0.18255 0.16111 0.19765 0.13148 L 0.27018 3.7037E-7 " pathEditMode="relative" rAng="0" ptsTypes="AAAAA">
+                                      <p:cBhvr>
+                                        <p:cTn id="104" dur="2000" fill="hold"/>
+                                        <p:tgtEl>
+                                          <p:spTgt spid="9"/>
+                                        </p:tgtEl>
+                                        <p:attrNameLst>
+                                          <p:attrName>ppt_x</p:attrName>
+                                          <p:attrName>ppt_y</p:attrName>
+                                        </p:attrNameLst>
+                                      </p:cBhvr>
+                                      <p:rCtr x="13503" y="8866"/>
+                                    </p:animMotion>
+                                  </p:childTnLst>
+                                </p:cTn>
+                              </p:par>
+                              <p:par>
+                                <p:cTn id="105" presetID="37" presetClass="path" presetSubtype="0" fill="hold" grpId="2" nodeType="withEffect">
+                                  <p:stCondLst>
+                                    <p:cond delay="0"/>
+                                  </p:stCondLst>
+                                  <p:childTnLst>
+                                    <p:animMotion origin="layout" path="M 0.00143 -0.01042 L -0.06979 -0.15579 C -0.08463 -0.18866 -0.10703 -0.20671 -0.13034 -0.20671 C -0.1569 -0.20671 -0.17825 -0.18866 -0.1931 -0.15579 L -0.26432 -0.01042 " pathEditMode="relative" rAng="0" ptsTypes="AAAAA">
+                                      <p:cBhvr>
+                                        <p:cTn id="106" dur="2000" fill="hold"/>
+                                        <p:tgtEl>
+                                          <p:spTgt spid="10"/>
+                                        </p:tgtEl>
+                                        <p:attrNameLst>
+                                          <p:attrName>ppt_x</p:attrName>
+                                          <p:attrName>ppt_y</p:attrName>
+                                        </p:attrNameLst>
+                                      </p:cBhvr>
+                                      <p:rCtr x="-13294" y="-9815"/>
+                                    </p:animMotion>
+                                  </p:childTnLst>
+                                </p:cTn>
+                              </p:par>
+                            </p:childTnLst>
+                          </p:cTn>
+                        </p:par>
+                      </p:childTnLst>
+                    </p:cTn>
+                  </p:par>
+                  <p:par>
+                    <p:cTn id="107" fill="hold">
+                      <p:stCondLst>
+                        <p:cond delay="indefinite"/>
+                      </p:stCondLst>
+                      <p:childTnLst>
+                        <p:par>
+                          <p:cTn id="108" fill="hold">
+                            <p:stCondLst>
+                              <p:cond delay="0"/>
+                            </p:stCondLst>
+                            <p:childTnLst>
+                              <p:par>
+                                <p:cTn id="109" presetID="10" presetClass="exit" presetSubtype="0" fill="hold" grpId="2" nodeType="clickEffect">
+                                  <p:stCondLst>
+                                    <p:cond delay="0"/>
+                                  </p:stCondLst>
+                                  <p:childTnLst>
+                                    <p:animEffect transition="out" filter="fade">
+                                      <p:cBhvr>
+                                        <p:cTn id="110" dur="500"/>
+                                        <p:tgtEl>
+                                          <p:spTgt spid="9"/>
+                                        </p:tgtEl>
+                                      </p:cBhvr>
+                                    </p:animEffect>
+                                    <p:set>
+                                      <p:cBhvr>
+                                        <p:cTn id="111" dur="1" fill="hold">
+                                          <p:stCondLst>
+                                            <p:cond delay="499"/>
+                                          </p:stCondLst>
+                                        </p:cTn>
+                                        <p:tgtEl>
+                                          <p:spTgt spid="9"/>
+                                        </p:tgtEl>
+                                        <p:attrNameLst>
+                                          <p:attrName>style.visibility</p:attrName>
+                                        </p:attrNameLst>
+                                      </p:cBhvr>
+                                      <p:to>
+                                        <p:strVal val="hidden"/>
+                                      </p:to>
+                                    </p:set>
+                                  </p:childTnLst>
+                                </p:cTn>
+                              </p:par>
+                              <p:par>
+                                <p:cTn id="112" presetID="10" presetClass="exit" presetSubtype="0" fill="hold" grpId="1" nodeType="withEffect">
+                                  <p:stCondLst>
+                                    <p:cond delay="0"/>
+                                  </p:stCondLst>
+                                  <p:childTnLst>
+                                    <p:animEffect transition="out" filter="fade">
+                                      <p:cBhvr>
+                                        <p:cTn id="113" dur="500"/>
+                                        <p:tgtEl>
+                                          <p:spTgt spid="10"/>
+                                        </p:tgtEl>
+                                      </p:cBhvr>
+                                    </p:animEffect>
+                                    <p:set>
+                                      <p:cBhvr>
+                                        <p:cTn id="114" dur="1" fill="hold">
+                                          <p:stCondLst>
+                                            <p:cond delay="499"/>
+                                          </p:stCondLst>
+                                        </p:cTn>
+                                        <p:tgtEl>
+                                          <p:spTgt spid="10"/>
+                                        </p:tgtEl>
+                                        <p:attrNameLst>
+                                          <p:attrName>style.visibility</p:attrName>
+                                        </p:attrNameLst>
+                                      </p:cBhvr>
+                                      <p:to>
+                                        <p:strVal val="hidden"/>
+                                      </p:to>
+                                    </p:set>
+                                  </p:childTnLst>
+                                </p:cTn>
+                              </p:par>
+                            </p:childTnLst>
+                          </p:cTn>
+                        </p:par>
+                      </p:childTnLst>
+                    </p:cTn>
+                  </p:par>
+                </p:childTnLst>
+              </p:cTn>
+              <p:prevCondLst>
+                <p:cond evt="onPrev" delay="0">
+                  <p:tgtEl>
+                    <p:sldTgt/>
+                  </p:tgtEl>
+                </p:cond>
+              </p:prevCondLst>
+              <p:nextCondLst>
+                <p:cond evt="onNext" delay="0">
+                  <p:tgtEl>
+                    <p:sldTgt/>
+                  </p:tgtEl>
+                </p:cond>
+              </p:nextCondLst>
+            </p:seq>
+          </p:childTnLst>
+        </p:cTn>
+      </p:par>
+    </p:tnLst>
+    <p:bldLst>
+      <p:bldP spid="3" grpId="0" uiExpand="1" build="p"/>
+      <p:bldP spid="5" grpId="0" uiExpand="1" animBg="1"/>
+      <p:bldP spid="5" grpId="1" uiExpand="1" animBg="1"/>
+      <p:bldP spid="5" grpId="2" uiExpand="1" animBg="1"/>
+      <p:bldP spid="5" grpId="3" uiExpand="1" animBg="1"/>
+      <p:bldP spid="5" grpId="4" uiExpand="1" animBg="1"/>
+      <p:bldP spid="5" grpId="6" uiExpand="1" animBg="1"/>
+      <p:bldP spid="5" grpId="9" animBg="1"/>
+      <p:bldP spid="5" grpId="10" animBg="1"/>
+      <p:bldP spid="5" grpId="11" animBg="1"/>
+      <p:bldP spid="5" grpId="12" animBg="1"/>
+      <p:bldP spid="7" grpId="0" animBg="1"/>
+      <p:bldP spid="7" grpId="1" animBg="1"/>
+      <p:bldP spid="7" grpId="2" animBg="1"/>
+      <p:bldP spid="8" grpId="4" animBg="1"/>
+      <p:bldP spid="8" grpId="6" animBg="1"/>
+      <p:bldP spid="8" grpId="9" animBg="1"/>
+      <p:bldP spid="9" grpId="1" animBg="1"/>
+      <p:bldP spid="9" grpId="2" animBg="1"/>
+      <p:bldP spid="9" grpId="3" animBg="1"/>
+      <p:bldP spid="10" grpId="0" animBg="1"/>
+      <p:bldP spid="10" grpId="1" animBg="1"/>
+      <p:bldP spid="10" grpId="2" animBg="1"/>
+    </p:bldLst>
+  </p:timing>
+</p:sld>
+</file>
+
+<file path=ppt/slides/slide15.xml><?xml version="1.0" encoding="utf-8"?>
+<p:sld xmlns:a="http://schemas.openxmlformats.org/drawingml/2006/main" xmlns:r="http://schemas.openxmlformats.org/officeDocument/2006/relationships" xmlns:p="http://schemas.openxmlformats.org/presentationml/2006/main">
+  <p:cSld>
+    <p:spTree>
+      <p:nvGrpSpPr>
+        <p:cNvPr id="1" name=""/>
+        <p:cNvGrpSpPr/>
+        <p:nvPr/>
+      </p:nvGrpSpPr>
+      <p:grpSpPr>
+        <a:xfrm>
+          <a:off x="0" y="0"/>
+          <a:ext cx="0" cy="0"/>
+          <a:chOff x="0" y="0"/>
+          <a:chExt cx="0" cy="0"/>
+        </a:xfrm>
+      </p:grpSpPr>
+      <p:sp>
+        <p:nvSpPr>
+          <p:cNvPr id="2" name="Title 1"/>
+          <p:cNvSpPr>
+            <a:spLocks noGrp="1"/>
+          </p:cNvSpPr>
+          <p:nvPr>
+            <p:ph type="title"/>
+          </p:nvPr>
+        </p:nvSpPr>
+        <p:spPr/>
+        <p:txBody>
+          <a:bodyPr/>
+          <a:lstStyle/>
+          <a:p>
+            <a:r>
+              <a:rPr lang="en-US" dirty="0" smtClean="0"/>
+              <a:t>Registering events</a:t>
+            </a:r>
+            <a:endParaRPr lang="en-US" dirty="0"/>
+          </a:p>
+        </p:txBody>
+      </p:sp>
+      <p:sp>
+        <p:nvSpPr>
+          <p:cNvPr id="3" name="Content Placeholder 2"/>
+          <p:cNvSpPr>
+            <a:spLocks noGrp="1"/>
+          </p:cNvSpPr>
+          <p:nvPr>
+            <p:ph sz="quarter" idx="10"/>
+          </p:nvPr>
+        </p:nvSpPr>
+        <p:spPr/>
+        <p:txBody>
+          <a:bodyPr/>
+          <a:lstStyle/>
+          <a:p>
+            <a:pPr marL="0" indent="0">
+              <a:buNone/>
+            </a:pPr>
+            <a:r>
+              <a:rPr lang="en-US" dirty="0" err="1">
+                <a:solidFill>
+                  <a:srgbClr val="0000FF"/>
+                </a:solidFill>
+                <a:highlight>
+                  <a:srgbClr val="FFFFFF"/>
+                </a:highlight>
+                <a:latin typeface="Consolas" panose="020B0609020204030204" pitchFamily="49" charset="0"/>
+              </a:rPr>
+              <a:t>var</a:t>
+            </a:r>
+            <a:r>
+              <a:rPr lang="en-US" dirty="0">
+                <a:solidFill>
+                  <a:srgbClr val="000000"/>
+                </a:solidFill>
+                <a:highlight>
+                  <a:srgbClr val="FFFFFF"/>
+                </a:highlight>
+                <a:latin typeface="Consolas" panose="020B0609020204030204" pitchFamily="49" charset="0"/>
+              </a:rPr>
+              <a:t> mc = </a:t>
+            </a:r>
+            <a:r>
+              <a:rPr lang="en-US" dirty="0">
+                <a:solidFill>
+                  <a:srgbClr val="0000FF"/>
+                </a:solidFill>
+                <a:highlight>
+                  <a:srgbClr val="FFFFFF"/>
+                </a:highlight>
+                <a:latin typeface="Consolas" panose="020B0609020204030204" pitchFamily="49" charset="0"/>
+              </a:rPr>
+              <a:t>new</a:t>
+            </a:r>
+            <a:r>
+              <a:rPr lang="en-US" dirty="0">
+                <a:solidFill>
+                  <a:srgbClr val="000000"/>
+                </a:solidFill>
+                <a:highlight>
+                  <a:srgbClr val="FFFFFF"/>
+                </a:highlight>
+                <a:latin typeface="Consolas" panose="020B0609020204030204" pitchFamily="49" charset="0"/>
+              </a:rPr>
+              <a:t> Hammer(target);</a:t>
+            </a:r>
+          </a:p>
+          <a:p>
+            <a:pPr marL="0" indent="0">
+              <a:buNone/>
+            </a:pPr>
+            <a:r>
+              <a:rPr lang="en-US" dirty="0" err="1">
+                <a:solidFill>
+                  <a:srgbClr val="000000"/>
+                </a:solidFill>
+                <a:highlight>
+                  <a:srgbClr val="FFFFFF"/>
+                </a:highlight>
+                <a:latin typeface="Consolas" panose="020B0609020204030204" pitchFamily="49" charset="0"/>
+              </a:rPr>
+              <a:t>mc.on</a:t>
+            </a:r>
+            <a:r>
+              <a:rPr lang="en-US" dirty="0">
+                <a:solidFill>
+                  <a:srgbClr val="000000"/>
+                </a:solidFill>
+                <a:highlight>
+                  <a:srgbClr val="FFFFFF"/>
+                </a:highlight>
+                <a:latin typeface="Consolas" panose="020B0609020204030204" pitchFamily="49" charset="0"/>
+              </a:rPr>
+              <a:t>(</a:t>
+            </a:r>
+            <a:r>
+              <a:rPr lang="en-US" dirty="0">
+                <a:solidFill>
+                  <a:srgbClr val="A31515"/>
+                </a:solidFill>
+                <a:highlight>
+                  <a:srgbClr val="FFFFFF"/>
+                </a:highlight>
+                <a:latin typeface="Consolas" panose="020B0609020204030204" pitchFamily="49" charset="0"/>
+              </a:rPr>
+              <a:t>'event'</a:t>
+            </a:r>
+            <a:r>
+              <a:rPr lang="en-US" dirty="0">
+                <a:solidFill>
+                  <a:srgbClr val="000000"/>
+                </a:solidFill>
+                <a:highlight>
+                  <a:srgbClr val="FFFFFF"/>
+                </a:highlight>
+                <a:latin typeface="Consolas" panose="020B0609020204030204" pitchFamily="49" charset="0"/>
+              </a:rPr>
+              <a:t>, </a:t>
+            </a:r>
+            <a:r>
+              <a:rPr lang="en-US" dirty="0">
+                <a:solidFill>
+                  <a:srgbClr val="0000FF"/>
+                </a:solidFill>
+                <a:highlight>
+                  <a:srgbClr val="FFFFFF"/>
+                </a:highlight>
+                <a:latin typeface="Consolas" panose="020B0609020204030204" pitchFamily="49" charset="0"/>
+              </a:rPr>
+              <a:t>function</a:t>
+            </a:r>
+            <a:r>
+              <a:rPr lang="en-US" dirty="0">
+                <a:solidFill>
+                  <a:srgbClr val="000000"/>
+                </a:solidFill>
+                <a:highlight>
+                  <a:srgbClr val="FFFFFF"/>
+                </a:highlight>
+                <a:latin typeface="Consolas" panose="020B0609020204030204" pitchFamily="49" charset="0"/>
+              </a:rPr>
+              <a:t> (</a:t>
+            </a:r>
+            <a:r>
+              <a:rPr lang="en-US" dirty="0" err="1">
+                <a:solidFill>
+                  <a:srgbClr val="000000"/>
+                </a:solidFill>
+                <a:highlight>
+                  <a:srgbClr val="FFFFFF"/>
+                </a:highlight>
+                <a:latin typeface="Consolas" panose="020B0609020204030204" pitchFamily="49" charset="0"/>
+              </a:rPr>
+              <a:t>ev</a:t>
+            </a:r>
+            <a:r>
+              <a:rPr lang="en-US" dirty="0">
+                <a:solidFill>
+                  <a:srgbClr val="000000"/>
+                </a:solidFill>
+                <a:highlight>
+                  <a:srgbClr val="FFFFFF"/>
+                </a:highlight>
+                <a:latin typeface="Consolas" panose="020B0609020204030204" pitchFamily="49" charset="0"/>
+              </a:rPr>
+              <a:t>) {</a:t>
+            </a:r>
+          </a:p>
+          <a:p>
+            <a:pPr marL="0" indent="0">
+              <a:buNone/>
+            </a:pPr>
+            <a:r>
+              <a:rPr lang="en-US" dirty="0" smtClean="0">
+                <a:solidFill>
+                  <a:srgbClr val="00B050"/>
+                </a:solidFill>
+                <a:highlight>
+                  <a:srgbClr val="FFFFFF"/>
+                </a:highlight>
+                <a:latin typeface="Consolas" panose="020B0609020204030204" pitchFamily="49" charset="0"/>
+              </a:rPr>
+              <a:t>   // event handler</a:t>
+            </a:r>
+            <a:endParaRPr lang="en-US" dirty="0">
+              <a:solidFill>
+                <a:srgbClr val="00B050"/>
+              </a:solidFill>
+              <a:highlight>
+                <a:srgbClr val="FFFFFF"/>
+              </a:highlight>
+              <a:latin typeface="Consolas" panose="020B0609020204030204" pitchFamily="49" charset="0"/>
+            </a:endParaRPr>
+          </a:p>
+          <a:p>
+            <a:pPr marL="0" indent="0">
+              <a:buNone/>
+            </a:pPr>
+            <a:r>
+              <a:rPr lang="en-US" dirty="0">
+                <a:solidFill>
+                  <a:srgbClr val="000000"/>
+                </a:solidFill>
+                <a:highlight>
+                  <a:srgbClr val="FFFFFF"/>
+                </a:highlight>
+                <a:latin typeface="Consolas" panose="020B0609020204030204" pitchFamily="49" charset="0"/>
+              </a:rPr>
+              <a:t>});</a:t>
+            </a:r>
+            <a:endParaRPr lang="en-US" dirty="0"/>
+          </a:p>
+        </p:txBody>
+      </p:sp>
+    </p:spTree>
+    <p:extLst>
+      <p:ext uri="{BB962C8B-B14F-4D97-AF65-F5344CB8AC3E}">
+        <p14:creationId xmlns:p14="http://schemas.microsoft.com/office/powerpoint/2010/main" val="3502126693"/>
+      </p:ext>
+    </p:extLst>
+  </p:cSld>
+  <p:clrMapOvr>
+    <a:masterClrMapping/>
+  </p:clrMapOvr>
+  <p:timing>
+    <p:tnLst>
+      <p:par>
+        <p:cTn id="1" dur="indefinite" restart="never" nodeType="tmRoot"/>
+      </p:par>
+    </p:tnLst>
+  </p:timing>
+</p:sld>
+</file>
+
+<file path=ppt/slides/slide16.xml><?xml version="1.0" encoding="utf-8"?>
+<p:sld xmlns:a="http://schemas.openxmlformats.org/drawingml/2006/main" xmlns:r="http://schemas.openxmlformats.org/officeDocument/2006/relationships" xmlns:p="http://schemas.openxmlformats.org/presentationml/2006/main">
+  <p:cSld>
+    <p:spTree>
+      <p:nvGrpSpPr>
+        <p:cNvPr id="1" name=""/>
+        <p:cNvGrpSpPr/>
+        <p:nvPr/>
+      </p:nvGrpSpPr>
+      <p:grpSpPr>
+        <a:xfrm>
+          <a:off x="0" y="0"/>
+          <a:ext cx="0" cy="0"/>
+          <a:chOff x="0" y="0"/>
+          <a:chExt cx="0" cy="0"/>
+        </a:xfrm>
+      </p:grpSpPr>
+      <p:sp>
+        <p:nvSpPr>
+          <p:cNvPr id="2" name="Title 1"/>
+          <p:cNvSpPr>
+            <a:spLocks noGrp="1"/>
+          </p:cNvSpPr>
+          <p:nvPr>
+            <p:ph type="title"/>
+          </p:nvPr>
+        </p:nvSpPr>
+        <p:spPr/>
+        <p:txBody>
+          <a:bodyPr/>
+          <a:lstStyle/>
+          <a:p>
+            <a:r>
+              <a:rPr lang="en-US" dirty="0" smtClean="0"/>
+              <a:t>Event properties</a:t>
+            </a:r>
+            <a:endParaRPr lang="en-US" dirty="0"/>
+          </a:p>
+        </p:txBody>
+      </p:sp>
+      <p:sp>
+        <p:nvSpPr>
+          <p:cNvPr id="3" name="Content Placeholder 2"/>
+          <p:cNvSpPr>
+            <a:spLocks noGrp="1"/>
+          </p:cNvSpPr>
+          <p:nvPr>
+            <p:ph sz="quarter" idx="10"/>
+          </p:nvPr>
+        </p:nvSpPr>
+        <p:spPr/>
+        <p:txBody>
+          <a:bodyPr>
+            <a:normAutofit lnSpcReduction="10000"/>
+          </a:bodyPr>
+          <a:lstStyle/>
+          <a:p>
+            <a:r>
+              <a:rPr lang="en-US" dirty="0" smtClean="0"/>
+              <a:t>type</a:t>
+            </a:r>
+          </a:p>
+          <a:p>
+            <a:pPr lvl="1"/>
+            <a:r>
+              <a:rPr lang="en-US" dirty="0" smtClean="0"/>
+              <a:t>Type of event</a:t>
+            </a:r>
+          </a:p>
+          <a:p>
+            <a:r>
+              <a:rPr lang="en-US" dirty="0" smtClean="0"/>
+              <a:t>direction</a:t>
+            </a:r>
+          </a:p>
+          <a:p>
+            <a:pPr lvl="1"/>
+            <a:r>
+              <a:rPr lang="en-US" dirty="0" smtClean="0"/>
+              <a:t>Right, left, horizontal, vertical</a:t>
+            </a:r>
+          </a:p>
+          <a:p>
+            <a:r>
+              <a:rPr lang="en-US" dirty="0" err="1" smtClean="0"/>
+              <a:t>deltaX</a:t>
+            </a:r>
+            <a:r>
+              <a:rPr lang="en-US" dirty="0" smtClean="0"/>
+              <a:t> and </a:t>
+            </a:r>
+            <a:r>
+              <a:rPr lang="en-US" dirty="0" err="1" smtClean="0"/>
+              <a:t>deltaY</a:t>
+            </a:r>
+            <a:endParaRPr lang="en-US" dirty="0" smtClean="0"/>
+          </a:p>
+          <a:p>
+            <a:pPr lvl="1"/>
+            <a:r>
+              <a:rPr lang="en-US" dirty="0" smtClean="0"/>
+              <a:t>Difference in pixels from starting XY coordinates</a:t>
+            </a:r>
+          </a:p>
+          <a:p>
+            <a:r>
+              <a:rPr lang="en-US" dirty="0" smtClean="0"/>
+              <a:t>scale</a:t>
+            </a:r>
+          </a:p>
+          <a:p>
+            <a:pPr lvl="1"/>
+            <a:r>
+              <a:rPr lang="en-US" dirty="0" smtClean="0"/>
+              <a:t>Based on a scale of 1</a:t>
+            </a:r>
+          </a:p>
+          <a:p>
+            <a:r>
+              <a:rPr lang="en-US" dirty="0" smtClean="0"/>
+              <a:t>rotation</a:t>
+            </a:r>
+          </a:p>
+          <a:p>
+            <a:pPr lvl="1"/>
+            <a:r>
+              <a:rPr lang="en-US" dirty="0" smtClean="0"/>
+              <a:t>Number of degrees of rotation</a:t>
+            </a:r>
+            <a:endParaRPr lang="en-US" dirty="0"/>
+          </a:p>
+        </p:txBody>
+      </p:sp>
+    </p:spTree>
+    <p:extLst>
+      <p:ext uri="{BB962C8B-B14F-4D97-AF65-F5344CB8AC3E}">
+        <p14:creationId xmlns:p14="http://schemas.microsoft.com/office/powerpoint/2010/main" val="213068886"/>
+      </p:ext>
+    </p:extLst>
+  </p:cSld>
+  <p:clrMapOvr>
+    <a:masterClrMapping/>
+  </p:clrMapOvr>
+  <p:timing>
+    <p:tnLst>
+      <p:par>
+        <p:cTn id="1" dur="indefinite" restart="never" nodeType="tmRoot"/>
+      </p:par>
+    </p:tnLst>
+  </p:timing>
+</p:sld>
+</file>
+
+<file path=ppt/slides/slide17.xml><?xml version="1.0" encoding="utf-8"?>
+<p:sld xmlns:a="http://schemas.openxmlformats.org/drawingml/2006/main" xmlns:r="http://schemas.openxmlformats.org/officeDocument/2006/relationships" xmlns:p="http://schemas.openxmlformats.org/presentationml/2006/main">
+  <p:cSld>
+    <p:spTree>
+      <p:nvGrpSpPr>
+        <p:cNvPr id="1" name=""/>
+        <p:cNvGrpSpPr/>
+        <p:nvPr/>
+      </p:nvGrpSpPr>
+      <p:grpSpPr>
+        <a:xfrm>
+          <a:off x="0" y="0"/>
+          <a:ext cx="0" cy="0"/>
+          <a:chOff x="0" y="0"/>
+          <a:chExt cx="0" cy="0"/>
+        </a:xfrm>
+      </p:grpSpPr>
+      <p:sp>
+        <p:nvSpPr>
+          <p:cNvPr id="6" name="Title 5"/>
+          <p:cNvSpPr>
+            <a:spLocks noGrp="1"/>
+          </p:cNvSpPr>
+          <p:nvPr>
+            <p:ph type="title"/>
+          </p:nvPr>
+        </p:nvSpPr>
+        <p:spPr/>
+        <p:txBody>
+          <a:bodyPr/>
+          <a:lstStyle/>
+          <a:p>
+            <a:r>
+              <a:rPr lang="en-US" dirty="0" smtClean="0"/>
+              <a:t>Hammer.js example</a:t>
+            </a:r>
+            <a:endParaRPr lang="en-US" dirty="0"/>
+          </a:p>
+        </p:txBody>
+      </p:sp>
+    </p:spTree>
+    <p:extLst>
+      <p:ext uri="{BB962C8B-B14F-4D97-AF65-F5344CB8AC3E}">
+        <p14:creationId xmlns:p14="http://schemas.microsoft.com/office/powerpoint/2010/main" val="4265147306"/>
+      </p:ext>
+    </p:extLst>
+  </p:cSld>
+  <p:clrMapOvr>
+    <a:masterClrMapping/>
+  </p:clrMapOvr>
+  <p:timing>
+    <p:tnLst>
+      <p:par>
+        <p:cTn id="1" dur="indefinite" restart="never" nodeType="tmRoot"/>
+      </p:par>
+    </p:tnLst>
+  </p:timing>
+</p:sld>
+</file>
+
+<file path=ppt/slides/slide18.xml><?xml version="1.0" encoding="utf-8"?>
+<p:sld xmlns:a="http://schemas.openxmlformats.org/drawingml/2006/main" xmlns:r="http://schemas.openxmlformats.org/officeDocument/2006/relationships" xmlns:p="http://schemas.openxmlformats.org/presentationml/2006/main">
+  <p:cSld>
+    <p:spTree>
+      <p:nvGrpSpPr>
+        <p:cNvPr id="1" name=""/>
+        <p:cNvGrpSpPr/>
+        <p:nvPr/>
+      </p:nvGrpSpPr>
+      <p:grpSpPr>
+        <a:xfrm>
+          <a:off x="0" y="0"/>
+          <a:ext cx="0" cy="0"/>
+          <a:chOff x="0" y="0"/>
+          <a:chExt cx="0" cy="0"/>
+        </a:xfrm>
+      </p:grpSpPr>
+      <p:sp>
+        <p:nvSpPr>
+          <p:cNvPr id="2" name="Title 1"/>
+          <p:cNvSpPr>
+            <a:spLocks noGrp="1"/>
+          </p:cNvSpPr>
+          <p:nvPr>
+            <p:ph type="title"/>
+          </p:nvPr>
+        </p:nvSpPr>
+        <p:spPr/>
+        <p:txBody>
+          <a:bodyPr/>
+          <a:lstStyle/>
+          <a:p>
+            <a:r>
+              <a:rPr lang="en-US" dirty="0" smtClean="0"/>
+              <a:t>Hammer.js in app</a:t>
+            </a:r>
+            <a:endParaRPr lang="en-US" dirty="0"/>
+          </a:p>
+        </p:txBody>
+      </p:sp>
+    </p:spTree>
+    <p:extLst>
+      <p:ext uri="{BB962C8B-B14F-4D97-AF65-F5344CB8AC3E}">
+        <p14:creationId xmlns:p14="http://schemas.microsoft.com/office/powerpoint/2010/main" val="1682531603"/>
+      </p:ext>
+    </p:extLst>
+  </p:cSld>
+  <p:clrMapOvr>
+    <a:masterClrMapping/>
+  </p:clrMapOvr>
+  <p:timing>
+    <p:tnLst>
+      <p:par>
+        <p:cTn id="1" dur="indefinite" restart="never" nodeType="tmRoot"/>
+      </p:par>
+    </p:tnLst>
+  </p:timing>
+</p:sld>
+</file>
+
+<file path=ppt/slides/slide19.xml><?xml version="1.0" encoding="utf-8"?>
+<p:sld xmlns:a="http://schemas.openxmlformats.org/drawingml/2006/main" xmlns:r="http://schemas.openxmlformats.org/officeDocument/2006/relationships" xmlns:p="http://schemas.openxmlformats.org/presentationml/2006/main">
+  <p:cSld>
+    <p:spTree>
+      <p:nvGrpSpPr>
+        <p:cNvPr id="1" name=""/>
+        <p:cNvGrpSpPr/>
+        <p:nvPr/>
+      </p:nvGrpSpPr>
+      <p:grpSpPr>
+        <a:xfrm>
+          <a:off x="0" y="0"/>
+          <a:ext cx="0" cy="0"/>
+          <a:chOff x="0" y="0"/>
+          <a:chExt cx="0" cy="0"/>
+        </a:xfrm>
+      </p:grpSpPr>
+    </p:spTree>
+    <p:extLst>
+      <p:ext uri="{BB962C8B-B14F-4D97-AF65-F5344CB8AC3E}">
+        <p14:creationId xmlns:p14="http://schemas.microsoft.com/office/powerpoint/2010/main" val="334063133"/>
       </p:ext>
     </p:extLst>
   </p:cSld>

</xml_diff>